<commit_message>
v6 drawing and slides completed. proposal approved.
</commit_message>
<xml_diff>
--- a/Woodworking project/Presentation for Woodwork competition.pptx
+++ b/Woodworking project/Presentation for Woodwork competition.pptx
@@ -12,6 +12,7 @@
     <p:sldId id="257" r:id="rId7"/>
     <p:sldId id="258" r:id="rId8"/>
     <p:sldId id="259" r:id="rId9"/>
+    <p:sldId id="260" r:id="rId10"/>
   </p:sldIdLst>
   <p:sldSz cy="5143500" cx="9144000"/>
   <p:notesSz cx="6858000" cy="9144000"/>
@@ -1075,6 +1076,106 @@
             <a:r>
               <a:rPr lang="en-GB"/>
               <a:t>Draw details on glass joints.</a:t>
+            </a:r>
+            <a:endParaRPr/>
+          </a:p>
+        </p:txBody>
+      </p:sp>
+    </p:spTree>
+  </p:cSld>
+  <p:clrMapOvr>
+    <a:masterClrMapping/>
+  </p:clrMapOvr>
+</p:notes>
+</file>
+
+<file path=ppt/notesSlides/notesSlide5.xml><?xml version="1.0" encoding="utf-8"?>
+<p:notes xmlns:a="http://schemas.openxmlformats.org/drawingml/2006/main" xmlns:r="http://schemas.openxmlformats.org/officeDocument/2006/relationships" xmlns:mc="http://schemas.openxmlformats.org/markup-compatibility/2006" xmlns:mv="urn:schemas-microsoft-com:mac:vml" xmlns:p="http://schemas.openxmlformats.org/presentationml/2006/main" xmlns:c="http://schemas.openxmlformats.org/drawingml/2006/chart" xmlns:dgm="http://schemas.openxmlformats.org/drawingml/2006/diagram" xmlns:o="urn:schemas-microsoft-com:office:office" xmlns:v="urn:schemas-microsoft-com:vml" xmlns:pvml="urn:schemas-microsoft-com:office:powerpoint" xmlns:com="http://schemas.openxmlformats.org/drawingml/2006/compatibility" xmlns:p14="http://schemas.microsoft.com/office/powerpoint/2010/main" xmlns:p15="http://schemas.microsoft.com/office/powerpoint/2012/main" xmlns:ahyp="http://schemas.microsoft.com/office/drawing/2018/hyperlinkcolor" showMasterPhAnim="0" showMasterSp="0">
+  <p:cSld>
+    <p:spTree>
+      <p:nvGrpSpPr>
+        <p:cNvPr id="243" name="Shape 243"/>
+        <p:cNvGrpSpPr/>
+        <p:nvPr/>
+      </p:nvGrpSpPr>
+      <p:grpSpPr>
+        <a:xfrm>
+          <a:off x="0" y="0"/>
+          <a:ext cx="0" cy="0"/>
+          <a:chOff x="0" y="0"/>
+          <a:chExt cx="0" cy="0"/>
+        </a:xfrm>
+      </p:grpSpPr>
+      <p:sp>
+        <p:nvSpPr>
+          <p:cNvPr id="244" name="Google Shape;244;g2eef032fe31_0_0:notes"/>
+          <p:cNvSpPr/>
+          <p:nvPr>
+            <p:ph idx="2" type="sldImg"/>
+          </p:nvPr>
+        </p:nvSpPr>
+        <p:spPr>
+          <a:xfrm>
+            <a:off x="381255" y="685800"/>
+            <a:ext cx="6096000" cy="3429000"/>
+          </a:xfrm>
+          <a:custGeom>
+            <a:rect b="b" l="l" r="r" t="t"/>
+            <a:pathLst>
+              <a:path extrusionOk="0" h="120000" w="120000">
+                <a:moveTo>
+                  <a:pt x="0" y="0"/>
+                </a:moveTo>
+                <a:lnTo>
+                  <a:pt x="120000" y="0"/>
+                </a:lnTo>
+                <a:lnTo>
+                  <a:pt x="120000" y="120000"/>
+                </a:lnTo>
+                <a:lnTo>
+                  <a:pt x="0" y="120000"/>
+                </a:lnTo>
+                <a:close/>
+              </a:path>
+            </a:pathLst>
+          </a:custGeom>
+        </p:spPr>
+      </p:sp>
+      <p:sp>
+        <p:nvSpPr>
+          <p:cNvPr id="245" name="Google Shape;245;g2eef032fe31_0_0:notes"/>
+          <p:cNvSpPr txBox="1"/>
+          <p:nvPr>
+            <p:ph idx="1" type="body"/>
+          </p:nvPr>
+        </p:nvSpPr>
+        <p:spPr>
+          <a:xfrm>
+            <a:off x="685800" y="4343400"/>
+            <a:ext cx="5486400" cy="4114800"/>
+          </a:xfrm>
+          <a:prstGeom prst="rect">
+            <a:avLst/>
+          </a:prstGeom>
+        </p:spPr>
+        <p:txBody>
+          <a:bodyPr anchorCtr="0" anchor="t" bIns="91425" lIns="91425" spcFirstLastPara="1" rIns="91425" wrap="square" tIns="91425">
+            <a:noAutofit/>
+          </a:bodyPr>
+          <a:lstStyle/>
+          <a:p>
+            <a:pPr indent="0" lvl="0" marL="0" rtl="0" algn="l">
+              <a:spcBef>
+                <a:spcPts val="0"/>
+              </a:spcBef>
+              <a:spcAft>
+                <a:spcPts val="0"/>
+              </a:spcAft>
+              <a:buNone/>
+            </a:pPr>
+            <a:r>
+              <a:rPr lang="en-GB"/>
+              <a:t>Door lock. Crop out finger joint horizontal. Flange coupling</a:t>
             </a:r>
             <a:endParaRPr/>
           </a:p>
@@ -12292,7 +12393,2094 @@
 </p:sld>
 </file>
 
+<file path=ppt/slides/slide5.xml><?xml version="1.0" encoding="utf-8"?>
+<p:sld xmlns:a="http://schemas.openxmlformats.org/drawingml/2006/main" xmlns:r="http://schemas.openxmlformats.org/officeDocument/2006/relationships" xmlns:mc="http://schemas.openxmlformats.org/markup-compatibility/2006" xmlns:mv="urn:schemas-microsoft-com:mac:vml" xmlns:p="http://schemas.openxmlformats.org/presentationml/2006/main" xmlns:c="http://schemas.openxmlformats.org/drawingml/2006/chart" xmlns:dgm="http://schemas.openxmlformats.org/drawingml/2006/diagram" xmlns:o="urn:schemas-microsoft-com:office:office" xmlns:v="urn:schemas-microsoft-com:vml" xmlns:pvml="urn:schemas-microsoft-com:office:powerpoint" xmlns:com="http://schemas.openxmlformats.org/drawingml/2006/compatibility" xmlns:p14="http://schemas.microsoft.com/office/powerpoint/2010/main" xmlns:p15="http://schemas.microsoft.com/office/powerpoint/2012/main" xmlns:ahyp="http://schemas.microsoft.com/office/drawing/2018/hyperlinkcolor">
+  <p:cSld>
+    <p:spTree>
+      <p:nvGrpSpPr>
+        <p:cNvPr id="246" name="Shape 246"/>
+        <p:cNvGrpSpPr/>
+        <p:nvPr/>
+      </p:nvGrpSpPr>
+      <p:grpSpPr>
+        <a:xfrm>
+          <a:off x="0" y="0"/>
+          <a:ext cx="0" cy="0"/>
+          <a:chOff x="0" y="0"/>
+          <a:chExt cx="0" cy="0"/>
+        </a:xfrm>
+      </p:grpSpPr>
+      <p:pic>
+        <p:nvPicPr>
+          <p:cNvPr id="247" name="Google Shape;247;p17"/>
+          <p:cNvPicPr preferRelativeResize="0"/>
+          <p:nvPr/>
+        </p:nvPicPr>
+        <p:blipFill rotWithShape="1">
+          <a:blip r:embed="rId3">
+            <a:alphaModFix/>
+          </a:blip>
+          <a:srcRect b="43971" l="69543" r="11519" t="0"/>
+          <a:stretch/>
+        </p:blipFill>
+        <p:spPr>
+          <a:xfrm>
+            <a:off x="479682" y="831893"/>
+            <a:ext cx="1557927" cy="2591146"/>
+          </a:xfrm>
+          <a:prstGeom prst="rect">
+            <a:avLst/>
+          </a:prstGeom>
+          <a:noFill/>
+          <a:ln>
+            <a:noFill/>
+          </a:ln>
+        </p:spPr>
+      </p:pic>
+      <p:pic>
+        <p:nvPicPr>
+          <p:cNvPr id="248" name="Google Shape;248;p17"/>
+          <p:cNvPicPr preferRelativeResize="0"/>
+          <p:nvPr/>
+        </p:nvPicPr>
+        <p:blipFill rotWithShape="1">
+          <a:blip r:embed="rId4">
+            <a:alphaModFix/>
+          </a:blip>
+          <a:srcRect b="29834" l="25952" r="61504" t="58808"/>
+          <a:stretch/>
+        </p:blipFill>
+        <p:spPr>
+          <a:xfrm>
+            <a:off x="2036558" y="733485"/>
+            <a:ext cx="1126757" cy="573545"/>
+          </a:xfrm>
+          <a:prstGeom prst="rect">
+            <a:avLst/>
+          </a:prstGeom>
+          <a:noFill/>
+          <a:ln>
+            <a:noFill/>
+          </a:ln>
+        </p:spPr>
+      </p:pic>
+      <p:sp>
+        <p:nvSpPr>
+          <p:cNvPr id="249" name="Google Shape;249;p17"/>
+          <p:cNvSpPr txBox="1"/>
+          <p:nvPr/>
+        </p:nvSpPr>
+        <p:spPr>
+          <a:xfrm>
+            <a:off x="325014" y="102322"/>
+            <a:ext cx="1362300" cy="411900"/>
+          </a:xfrm>
+          <a:prstGeom prst="rect">
+            <a:avLst/>
+          </a:prstGeom>
+          <a:noFill/>
+          <a:ln>
+            <a:noFill/>
+          </a:ln>
+        </p:spPr>
+        <p:txBody>
+          <a:bodyPr anchorCtr="0" anchor="t" bIns="51525" lIns="51525" spcFirstLastPara="1" rIns="51525" wrap="square" tIns="51525">
+            <a:spAutoFit/>
+          </a:bodyPr>
+          <a:lstStyle/>
+          <a:p>
+            <a:pPr indent="0" lvl="0" marL="0" rtl="0" algn="l">
+              <a:spcBef>
+                <a:spcPts val="0"/>
+              </a:spcBef>
+              <a:spcAft>
+                <a:spcPts val="0"/>
+              </a:spcAft>
+              <a:buNone/>
+            </a:pPr>
+            <a:r>
+              <a:rPr lang="en-GB" sz="2000" u="sng"/>
+              <a:t>Design 6</a:t>
+            </a:r>
+            <a:endParaRPr sz="1200"/>
+          </a:p>
+        </p:txBody>
+      </p:sp>
+      <p:pic>
+        <p:nvPicPr>
+          <p:cNvPr id="250" name="Google Shape;250;p17"/>
+          <p:cNvPicPr preferRelativeResize="0"/>
+          <p:nvPr/>
+        </p:nvPicPr>
+        <p:blipFill rotWithShape="1">
+          <a:blip r:embed="rId5">
+            <a:alphaModFix/>
+          </a:blip>
+          <a:srcRect b="39245" l="35173" r="35223" t="26818"/>
+          <a:stretch/>
+        </p:blipFill>
+        <p:spPr>
+          <a:xfrm>
+            <a:off x="5326993" y="2995516"/>
+            <a:ext cx="2053422" cy="1323255"/>
+          </a:xfrm>
+          <a:prstGeom prst="rect">
+            <a:avLst/>
+          </a:prstGeom>
+          <a:noFill/>
+          <a:ln>
+            <a:noFill/>
+          </a:ln>
+        </p:spPr>
+      </p:pic>
+      <p:pic>
+        <p:nvPicPr>
+          <p:cNvPr id="251" name="Google Shape;251;p17"/>
+          <p:cNvPicPr preferRelativeResize="0"/>
+          <p:nvPr/>
+        </p:nvPicPr>
+        <p:blipFill rotWithShape="1">
+          <a:blip r:embed="rId6">
+            <a:alphaModFix/>
+          </a:blip>
+          <a:srcRect b="13166" l="17930" r="52884" t="40093"/>
+          <a:stretch/>
+        </p:blipFill>
+        <p:spPr>
+          <a:xfrm>
+            <a:off x="7539929" y="-6"/>
+            <a:ext cx="1604069" cy="1444224"/>
+          </a:xfrm>
+          <a:prstGeom prst="rect">
+            <a:avLst/>
+          </a:prstGeom>
+          <a:noFill/>
+          <a:ln>
+            <a:noFill/>
+          </a:ln>
+        </p:spPr>
+      </p:pic>
+      <p:pic>
+        <p:nvPicPr>
+          <p:cNvPr id="252" name="Google Shape;252;p17"/>
+          <p:cNvPicPr preferRelativeResize="0"/>
+          <p:nvPr/>
+        </p:nvPicPr>
+        <p:blipFill rotWithShape="1">
+          <a:blip r:embed="rId7">
+            <a:alphaModFix/>
+          </a:blip>
+          <a:srcRect b="70491" l="75342" r="16548" t="14870"/>
+          <a:stretch/>
+        </p:blipFill>
+        <p:spPr>
+          <a:xfrm>
+            <a:off x="6381395" y="2503571"/>
+            <a:ext cx="565179" cy="573539"/>
+          </a:xfrm>
+          <a:prstGeom prst="rect">
+            <a:avLst/>
+          </a:prstGeom>
+          <a:noFill/>
+          <a:ln>
+            <a:noFill/>
+          </a:ln>
+        </p:spPr>
+      </p:pic>
+      <p:pic>
+        <p:nvPicPr>
+          <p:cNvPr id="253" name="Google Shape;253;p17"/>
+          <p:cNvPicPr preferRelativeResize="0"/>
+          <p:nvPr/>
+        </p:nvPicPr>
+        <p:blipFill rotWithShape="1">
+          <a:blip r:embed="rId8">
+            <a:alphaModFix/>
+          </a:blip>
+          <a:srcRect b="66845" l="32709" r="61722" t="16906"/>
+          <a:stretch/>
+        </p:blipFill>
+        <p:spPr>
+          <a:xfrm rot="5400000">
+            <a:off x="6855208" y="-119153"/>
+            <a:ext cx="278085" cy="721027"/>
+          </a:xfrm>
+          <a:prstGeom prst="rect">
+            <a:avLst/>
+          </a:prstGeom>
+          <a:noFill/>
+          <a:ln>
+            <a:noFill/>
+          </a:ln>
+        </p:spPr>
+      </p:pic>
+      <p:pic>
+        <p:nvPicPr>
+          <p:cNvPr id="254" name="Google Shape;254;p17"/>
+          <p:cNvPicPr preferRelativeResize="0"/>
+          <p:nvPr/>
+        </p:nvPicPr>
+        <p:blipFill rotWithShape="1">
+          <a:blip r:embed="rId9">
+            <a:alphaModFix/>
+          </a:blip>
+          <a:srcRect b="50585" l="32592" r="55718" t="38830"/>
+          <a:stretch/>
+        </p:blipFill>
+        <p:spPr>
+          <a:xfrm>
+            <a:off x="7373621" y="3198777"/>
+            <a:ext cx="1126671" cy="573545"/>
+          </a:xfrm>
+          <a:prstGeom prst="rect">
+            <a:avLst/>
+          </a:prstGeom>
+          <a:noFill/>
+          <a:ln>
+            <a:noFill/>
+          </a:ln>
+        </p:spPr>
+      </p:pic>
+      <p:pic>
+        <p:nvPicPr>
+          <p:cNvPr id="255" name="Google Shape;255;p17"/>
+          <p:cNvPicPr preferRelativeResize="0"/>
+          <p:nvPr/>
+        </p:nvPicPr>
+        <p:blipFill rotWithShape="1">
+          <a:blip r:embed="rId10">
+            <a:alphaModFix/>
+          </a:blip>
+          <a:srcRect b="35703" l="35203" r="55293" t="47247"/>
+          <a:stretch/>
+        </p:blipFill>
+        <p:spPr>
+          <a:xfrm>
+            <a:off x="8301190" y="3548893"/>
+            <a:ext cx="719334" cy="725499"/>
+          </a:xfrm>
+          <a:prstGeom prst="rect">
+            <a:avLst/>
+          </a:prstGeom>
+          <a:noFill/>
+          <a:ln>
+            <a:noFill/>
+          </a:ln>
+        </p:spPr>
+      </p:pic>
+      <p:sp>
+        <p:nvSpPr>
+          <p:cNvPr id="256" name="Google Shape;256;p17"/>
+          <p:cNvSpPr txBox="1"/>
+          <p:nvPr/>
+        </p:nvSpPr>
+        <p:spPr>
+          <a:xfrm>
+            <a:off x="7640456" y="4150447"/>
+            <a:ext cx="1431000" cy="966000"/>
+          </a:xfrm>
+          <a:prstGeom prst="rect">
+            <a:avLst/>
+          </a:prstGeom>
+          <a:noFill/>
+          <a:ln>
+            <a:noFill/>
+          </a:ln>
+        </p:spPr>
+        <p:txBody>
+          <a:bodyPr anchorCtr="0" anchor="t" bIns="51525" lIns="51525" spcFirstLastPara="1" rIns="51525" wrap="square" tIns="51525">
+            <a:spAutoFit/>
+          </a:bodyPr>
+          <a:lstStyle/>
+          <a:p>
+            <a:pPr indent="0" lvl="0" marL="0" rtl="0" algn="l">
+              <a:spcBef>
+                <a:spcPts val="0"/>
+              </a:spcBef>
+              <a:spcAft>
+                <a:spcPts val="0"/>
+              </a:spcAft>
+              <a:buClr>
+                <a:schemeClr val="dk1"/>
+              </a:buClr>
+              <a:buSzPts val="600"/>
+              <a:buFont typeface="Arial"/>
+              <a:buNone/>
+            </a:pPr>
+            <a:r>
+              <a:rPr lang="en-GB" sz="700">
+                <a:solidFill>
+                  <a:schemeClr val="dk1"/>
+                </a:solidFill>
+              </a:rPr>
+              <a:t>Like design 5, Design 6 will incorporate Mitre joints for the main rubberwood panels. Based on my research on wood joints, the usage of mitre joints for wood panels at this size is likely to be easier.</a:t>
+            </a:r>
+            <a:endParaRPr sz="700">
+              <a:solidFill>
+                <a:schemeClr val="dk1"/>
+              </a:solidFill>
+            </a:endParaRPr>
+          </a:p>
+          <a:p>
+            <a:pPr indent="0" lvl="0" marL="0" rtl="0" algn="l">
+              <a:spcBef>
+                <a:spcPts val="0"/>
+              </a:spcBef>
+              <a:spcAft>
+                <a:spcPts val="0"/>
+              </a:spcAft>
+              <a:buNone/>
+            </a:pPr>
+            <a:r>
+              <a:t/>
+            </a:r>
+            <a:endParaRPr sz="700"/>
+          </a:p>
+        </p:txBody>
+      </p:sp>
+      <p:sp>
+        <p:nvSpPr>
+          <p:cNvPr id="257" name="Google Shape;257;p17"/>
+          <p:cNvSpPr txBox="1"/>
+          <p:nvPr/>
+        </p:nvSpPr>
+        <p:spPr>
+          <a:xfrm>
+            <a:off x="7002342" y="2503572"/>
+            <a:ext cx="2095800" cy="642900"/>
+          </a:xfrm>
+          <a:prstGeom prst="rect">
+            <a:avLst/>
+          </a:prstGeom>
+          <a:noFill/>
+          <a:ln>
+            <a:noFill/>
+          </a:ln>
+        </p:spPr>
+        <p:txBody>
+          <a:bodyPr anchorCtr="0" anchor="t" bIns="51525" lIns="51525" spcFirstLastPara="1" rIns="51525" wrap="square" tIns="51525">
+            <a:spAutoFit/>
+          </a:bodyPr>
+          <a:lstStyle/>
+          <a:p>
+            <a:pPr indent="0" lvl="0" marL="0" rtl="0" algn="l">
+              <a:spcBef>
+                <a:spcPts val="0"/>
+              </a:spcBef>
+              <a:spcAft>
+                <a:spcPts val="0"/>
+              </a:spcAft>
+              <a:buNone/>
+            </a:pPr>
+            <a:r>
+              <a:rPr lang="en-GB" sz="700"/>
+              <a:t>A lock mechanism needs to be incorporated to prevent unauthorised access/touching/theft of the displaying artifact. The display case needs to aim to give the displaying artifact a safe and secure environment to display in.</a:t>
+            </a:r>
+            <a:endParaRPr sz="700"/>
+          </a:p>
+        </p:txBody>
+      </p:sp>
+      <p:sp>
+        <p:nvSpPr>
+          <p:cNvPr id="258" name="Google Shape;258;p17"/>
+          <p:cNvSpPr txBox="1"/>
+          <p:nvPr/>
+        </p:nvSpPr>
+        <p:spPr>
+          <a:xfrm>
+            <a:off x="6437554" y="1310451"/>
+            <a:ext cx="2730300" cy="1289400"/>
+          </a:xfrm>
+          <a:prstGeom prst="rect">
+            <a:avLst/>
+          </a:prstGeom>
+          <a:noFill/>
+          <a:ln>
+            <a:noFill/>
+          </a:ln>
+        </p:spPr>
+        <p:txBody>
+          <a:bodyPr anchorCtr="0" anchor="t" bIns="51525" lIns="51525" spcFirstLastPara="1" rIns="51525" wrap="square" tIns="51525">
+            <a:spAutoFit/>
+          </a:bodyPr>
+          <a:lstStyle/>
+          <a:p>
+            <a:pPr indent="0" lvl="0" marL="0" rtl="0" algn="l">
+              <a:spcBef>
+                <a:spcPts val="0"/>
+              </a:spcBef>
+              <a:spcAft>
+                <a:spcPts val="0"/>
+              </a:spcAft>
+              <a:buClr>
+                <a:schemeClr val="dk1"/>
+              </a:buClr>
+              <a:buSzPts val="600"/>
+              <a:buFont typeface="Arial"/>
+              <a:buNone/>
+            </a:pPr>
+            <a:r>
+              <a:rPr lang="en-GB" sz="700">
+                <a:solidFill>
+                  <a:schemeClr val="dk1"/>
+                </a:solidFill>
+              </a:rPr>
+              <a:t>In this design, the transparent bit, or the acrylic case will be an independent bit, sort of 5 acrylic face panels glued together, this means the case wouldn’t be directly attached to the main display case. So, in order to hold the acrylic section in place, I will likely need to create a change in height, which will act like a track for the acrylic section to sit on. A good reason for acrylic instead of glass used here is that acrylic is fairly light, which means its more easily removable, making maintenance and installation much easier for the museum worker to clean or change the displaying artifact, as stated in the design specification.</a:t>
+            </a:r>
+            <a:endParaRPr sz="700">
+              <a:solidFill>
+                <a:schemeClr val="dk1"/>
+              </a:solidFill>
+            </a:endParaRPr>
+          </a:p>
+          <a:p>
+            <a:pPr indent="0" lvl="0" marL="0" rtl="0" algn="l">
+              <a:spcBef>
+                <a:spcPts val="0"/>
+              </a:spcBef>
+              <a:spcAft>
+                <a:spcPts val="0"/>
+              </a:spcAft>
+              <a:buNone/>
+            </a:pPr>
+            <a:r>
+              <a:t/>
+            </a:r>
+            <a:endParaRPr sz="700"/>
+          </a:p>
+        </p:txBody>
+      </p:sp>
+      <p:sp>
+        <p:nvSpPr>
+          <p:cNvPr id="259" name="Google Shape;259;p17"/>
+          <p:cNvSpPr txBox="1"/>
+          <p:nvPr/>
+        </p:nvSpPr>
+        <p:spPr>
+          <a:xfrm>
+            <a:off x="3806991" y="4466960"/>
+            <a:ext cx="1923600" cy="750600"/>
+          </a:xfrm>
+          <a:prstGeom prst="rect">
+            <a:avLst/>
+          </a:prstGeom>
+          <a:noFill/>
+          <a:ln>
+            <a:noFill/>
+          </a:ln>
+        </p:spPr>
+        <p:txBody>
+          <a:bodyPr anchorCtr="0" anchor="t" bIns="51525" lIns="51525" spcFirstLastPara="1" rIns="51525" wrap="square" tIns="51525">
+            <a:spAutoFit/>
+          </a:bodyPr>
+          <a:lstStyle/>
+          <a:p>
+            <a:pPr indent="0" lvl="0" marL="0" rtl="0" algn="l">
+              <a:spcBef>
+                <a:spcPts val="0"/>
+              </a:spcBef>
+              <a:spcAft>
+                <a:spcPts val="0"/>
+              </a:spcAft>
+              <a:buNone/>
+            </a:pPr>
+            <a:r>
+              <a:rPr lang="en-GB" sz="700"/>
+              <a:t>The display spinner’s bottom bit will be a motor axle, which will be 3D printed and locked tightly to the motor axle, so the spinner will be spun.</a:t>
+            </a:r>
+            <a:endParaRPr sz="700"/>
+          </a:p>
+          <a:p>
+            <a:pPr indent="0" lvl="0" marL="0" rtl="0" algn="l">
+              <a:spcBef>
+                <a:spcPts val="0"/>
+              </a:spcBef>
+              <a:spcAft>
+                <a:spcPts val="0"/>
+              </a:spcAft>
+              <a:buNone/>
+            </a:pPr>
+            <a:r>
+              <a:t/>
+            </a:r>
+            <a:endParaRPr sz="700"/>
+          </a:p>
+          <a:p>
+            <a:pPr indent="0" lvl="0" marL="0" rtl="0" algn="l">
+              <a:spcBef>
+                <a:spcPts val="0"/>
+              </a:spcBef>
+              <a:spcAft>
+                <a:spcPts val="0"/>
+              </a:spcAft>
+              <a:buNone/>
+            </a:pPr>
+            <a:r>
+              <a:t/>
+            </a:r>
+            <a:endParaRPr sz="700"/>
+          </a:p>
+        </p:txBody>
+      </p:sp>
+      <p:sp>
+        <p:nvSpPr>
+          <p:cNvPr id="260" name="Google Shape;260;p17"/>
+          <p:cNvSpPr txBox="1"/>
+          <p:nvPr/>
+        </p:nvSpPr>
+        <p:spPr>
+          <a:xfrm>
+            <a:off x="3029132" y="573725"/>
+            <a:ext cx="1923600" cy="1181400"/>
+          </a:xfrm>
+          <a:prstGeom prst="rect">
+            <a:avLst/>
+          </a:prstGeom>
+          <a:noFill/>
+          <a:ln>
+            <a:noFill/>
+          </a:ln>
+        </p:spPr>
+        <p:txBody>
+          <a:bodyPr anchorCtr="0" anchor="t" bIns="51525" lIns="51525" spcFirstLastPara="1" rIns="51525" wrap="square" tIns="51525">
+            <a:spAutoFit/>
+          </a:bodyPr>
+          <a:lstStyle/>
+          <a:p>
+            <a:pPr indent="0" lvl="0" marL="0" rtl="0" algn="l">
+              <a:spcBef>
+                <a:spcPts val="0"/>
+              </a:spcBef>
+              <a:spcAft>
+                <a:spcPts val="0"/>
+              </a:spcAft>
+              <a:buClr>
+                <a:schemeClr val="dk1"/>
+              </a:buClr>
+              <a:buSzPts val="600"/>
+              <a:buFont typeface="Arial"/>
+              <a:buNone/>
+            </a:pPr>
+            <a:r>
+              <a:rPr lang="en-GB" sz="700">
+                <a:solidFill>
+                  <a:schemeClr val="dk1"/>
+                </a:solidFill>
+              </a:rPr>
+              <a:t>This section is where the LED lamps and display spinner will sit on, which this square area will consist of the display spinner and 2 LED lamps. LED lamps are used as they wasted 85% less energy than incandescent lamps, higher energy efficiency, as stated in the design specification, to reduce energy consumption overall, reducing carbon footprint.</a:t>
+            </a:r>
+            <a:endParaRPr sz="700">
+              <a:solidFill>
+                <a:schemeClr val="dk1"/>
+              </a:solidFill>
+            </a:endParaRPr>
+          </a:p>
+          <a:p>
+            <a:pPr indent="0" lvl="0" marL="0" rtl="0" algn="l">
+              <a:spcBef>
+                <a:spcPts val="0"/>
+              </a:spcBef>
+              <a:spcAft>
+                <a:spcPts val="0"/>
+              </a:spcAft>
+              <a:buNone/>
+            </a:pPr>
+            <a:r>
+              <a:t/>
+            </a:r>
+            <a:endParaRPr sz="700"/>
+          </a:p>
+        </p:txBody>
+      </p:sp>
+      <p:sp>
+        <p:nvSpPr>
+          <p:cNvPr id="261" name="Google Shape;261;p17"/>
+          <p:cNvSpPr txBox="1"/>
+          <p:nvPr/>
+        </p:nvSpPr>
+        <p:spPr>
+          <a:xfrm>
+            <a:off x="430802" y="494338"/>
+            <a:ext cx="1052700" cy="319500"/>
+          </a:xfrm>
+          <a:prstGeom prst="rect">
+            <a:avLst/>
+          </a:prstGeom>
+          <a:noFill/>
+          <a:ln>
+            <a:noFill/>
+          </a:ln>
+        </p:spPr>
+        <p:txBody>
+          <a:bodyPr anchorCtr="0" anchor="t" bIns="51525" lIns="51525" spcFirstLastPara="1" rIns="51525" wrap="square" tIns="51525">
+            <a:spAutoFit/>
+          </a:bodyPr>
+          <a:lstStyle/>
+          <a:p>
+            <a:pPr indent="0" lvl="0" marL="0" rtl="0" algn="l">
+              <a:spcBef>
+                <a:spcPts val="0"/>
+              </a:spcBef>
+              <a:spcAft>
+                <a:spcPts val="0"/>
+              </a:spcAft>
+              <a:buNone/>
+            </a:pPr>
+            <a:r>
+              <a:rPr lang="en-GB" sz="700"/>
+              <a:t>Lock mechanism to prevent theft.</a:t>
+            </a:r>
+            <a:endParaRPr sz="700"/>
+          </a:p>
+        </p:txBody>
+      </p:sp>
+      <p:sp>
+        <p:nvSpPr>
+          <p:cNvPr id="262" name="Google Shape;262;p17"/>
+          <p:cNvSpPr txBox="1"/>
+          <p:nvPr/>
+        </p:nvSpPr>
+        <p:spPr>
+          <a:xfrm>
+            <a:off x="2050468" y="9140"/>
+            <a:ext cx="2536800" cy="642900"/>
+          </a:xfrm>
+          <a:prstGeom prst="rect">
+            <a:avLst/>
+          </a:prstGeom>
+          <a:noFill/>
+          <a:ln>
+            <a:noFill/>
+          </a:ln>
+        </p:spPr>
+        <p:txBody>
+          <a:bodyPr anchorCtr="0" anchor="t" bIns="51525" lIns="51525" spcFirstLastPara="1" rIns="51525" wrap="square" tIns="51525">
+            <a:spAutoFit/>
+          </a:bodyPr>
+          <a:lstStyle/>
+          <a:p>
+            <a:pPr indent="0" lvl="0" marL="0" rtl="0" algn="l">
+              <a:spcBef>
+                <a:spcPts val="0"/>
+              </a:spcBef>
+              <a:spcAft>
+                <a:spcPts val="0"/>
+              </a:spcAft>
+              <a:buNone/>
+            </a:pPr>
+            <a:r>
+              <a:rPr lang="en-GB" sz="700"/>
+              <a:t>The top bit, needs to be transparent in order for viewer to see through it to observe the object which is displaying. This part will likely be made of acrylic or glass. Chloroform would be used if acrylic, and UV glue or silicone could be used if glass is used in this part.</a:t>
+            </a:r>
+            <a:endParaRPr sz="700"/>
+          </a:p>
+        </p:txBody>
+      </p:sp>
+      <p:cxnSp>
+        <p:nvCxnSpPr>
+          <p:cNvPr id="263" name="Google Shape;263;p17"/>
+          <p:cNvCxnSpPr>
+            <a:stCxn id="262" idx="1"/>
+          </p:cNvCxnSpPr>
+          <p:nvPr/>
+        </p:nvCxnSpPr>
+        <p:spPr>
+          <a:xfrm flipH="1">
+            <a:off x="1584268" y="330590"/>
+            <a:ext cx="466200" cy="762000"/>
+          </a:xfrm>
+          <a:prstGeom prst="straightConnector1">
+            <a:avLst/>
+          </a:prstGeom>
+          <a:noFill/>
+          <a:ln cap="flat" cmpd="sng" w="19050">
+            <a:solidFill>
+              <a:schemeClr val="dk2"/>
+            </a:solidFill>
+            <a:prstDash val="solid"/>
+            <a:round/>
+            <a:headEnd len="med" w="med" type="none"/>
+            <a:tailEnd len="med" w="med" type="stealth"/>
+          </a:ln>
+        </p:spPr>
+      </p:cxnSp>
+      <p:cxnSp>
+        <p:nvCxnSpPr>
+          <p:cNvPr id="264" name="Google Shape;264;p17"/>
+          <p:cNvCxnSpPr/>
+          <p:nvPr/>
+        </p:nvCxnSpPr>
+        <p:spPr>
+          <a:xfrm>
+            <a:off x="603038" y="742012"/>
+            <a:ext cx="49500" cy="899400"/>
+          </a:xfrm>
+          <a:prstGeom prst="straightConnector1">
+            <a:avLst/>
+          </a:prstGeom>
+          <a:noFill/>
+          <a:ln cap="flat" cmpd="sng" w="19050">
+            <a:solidFill>
+              <a:schemeClr val="dk2"/>
+            </a:solidFill>
+            <a:prstDash val="solid"/>
+            <a:round/>
+            <a:headEnd len="med" w="med" type="none"/>
+            <a:tailEnd len="med" w="med" type="stealth"/>
+          </a:ln>
+        </p:spPr>
+      </p:cxnSp>
+      <p:cxnSp>
+        <p:nvCxnSpPr>
+          <p:cNvPr id="265" name="Google Shape;265;p17"/>
+          <p:cNvCxnSpPr/>
+          <p:nvPr/>
+        </p:nvCxnSpPr>
+        <p:spPr>
+          <a:xfrm flipH="1" rot="10800000">
+            <a:off x="7528666" y="841240"/>
+            <a:ext cx="582300" cy="357900"/>
+          </a:xfrm>
+          <a:prstGeom prst="straightConnector1">
+            <a:avLst/>
+          </a:prstGeom>
+          <a:noFill/>
+          <a:ln cap="flat" cmpd="sng" w="19050">
+            <a:solidFill>
+              <a:schemeClr val="dk2"/>
+            </a:solidFill>
+            <a:prstDash val="solid"/>
+            <a:round/>
+            <a:headEnd len="med" w="med" type="none"/>
+            <a:tailEnd len="med" w="med" type="stealth"/>
+          </a:ln>
+        </p:spPr>
+      </p:cxnSp>
+      <p:pic>
+        <p:nvPicPr>
+          <p:cNvPr id="266" name="Google Shape;266;p17"/>
+          <p:cNvPicPr preferRelativeResize="0"/>
+          <p:nvPr/>
+        </p:nvPicPr>
+        <p:blipFill>
+          <a:blip r:embed="rId11">
+            <a:alphaModFix/>
+          </a:blip>
+          <a:stretch>
+            <a:fillRect/>
+          </a:stretch>
+        </p:blipFill>
+        <p:spPr>
+          <a:xfrm>
+            <a:off x="2191128" y="1412232"/>
+            <a:ext cx="692510" cy="254445"/>
+          </a:xfrm>
+          <a:prstGeom prst="rect">
+            <a:avLst/>
+          </a:prstGeom>
+          <a:noFill/>
+          <a:ln>
+            <a:noFill/>
+          </a:ln>
+        </p:spPr>
+      </p:pic>
+      <p:sp>
+        <p:nvSpPr>
+          <p:cNvPr id="267" name="Google Shape;267;p17"/>
+          <p:cNvSpPr txBox="1"/>
+          <p:nvPr/>
+        </p:nvSpPr>
+        <p:spPr>
+          <a:xfrm>
+            <a:off x="2415056" y="1583615"/>
+            <a:ext cx="3199500" cy="858300"/>
+          </a:xfrm>
+          <a:prstGeom prst="rect">
+            <a:avLst/>
+          </a:prstGeom>
+          <a:noFill/>
+          <a:ln>
+            <a:noFill/>
+          </a:ln>
+        </p:spPr>
+        <p:txBody>
+          <a:bodyPr anchorCtr="0" anchor="t" bIns="51525" lIns="51525" spcFirstLastPara="1" rIns="51525" wrap="square" tIns="51525">
+            <a:spAutoFit/>
+          </a:bodyPr>
+          <a:lstStyle/>
+          <a:p>
+            <a:pPr indent="0" lvl="0" marL="0" rtl="0" algn="l">
+              <a:spcBef>
+                <a:spcPts val="0"/>
+              </a:spcBef>
+              <a:spcAft>
+                <a:spcPts val="0"/>
+              </a:spcAft>
+              <a:buClr>
+                <a:schemeClr val="dk1"/>
+              </a:buClr>
+              <a:buSzPts val="600"/>
+              <a:buFont typeface="Arial"/>
+              <a:buNone/>
+            </a:pPr>
+            <a:r>
+              <a:rPr lang="en-GB" sz="700">
+                <a:solidFill>
+                  <a:schemeClr val="dk1"/>
+                </a:solidFill>
+              </a:rPr>
+              <a:t>This is where the button panels are located in this design. The button panel will control the speed of which the motor is spinning, and whether the lights in this sphere display case is on or not. The RTC and Arduino microcontroller will be placed behind this button panel. The RTC will tell the Arduino to turn off the lights and motor off during closing hours to further reduce energy consumption, as stated in the specification.</a:t>
+            </a:r>
+            <a:endParaRPr sz="700">
+              <a:solidFill>
+                <a:schemeClr val="dk1"/>
+              </a:solidFill>
+            </a:endParaRPr>
+          </a:p>
+          <a:p>
+            <a:pPr indent="0" lvl="0" marL="0" rtl="0" algn="l">
+              <a:spcBef>
+                <a:spcPts val="0"/>
+              </a:spcBef>
+              <a:spcAft>
+                <a:spcPts val="0"/>
+              </a:spcAft>
+              <a:buNone/>
+            </a:pPr>
+            <a:r>
+              <a:t/>
+            </a:r>
+            <a:endParaRPr sz="700"/>
+          </a:p>
+        </p:txBody>
+      </p:sp>
+      <p:pic>
+        <p:nvPicPr>
+          <p:cNvPr id="268" name="Google Shape;268;p17"/>
+          <p:cNvPicPr preferRelativeResize="0"/>
+          <p:nvPr/>
+        </p:nvPicPr>
+        <p:blipFill rotWithShape="1">
+          <a:blip r:embed="rId12">
+            <a:alphaModFix/>
+          </a:blip>
+          <a:srcRect b="54211" l="36924" r="55480" t="32704"/>
+          <a:stretch/>
+        </p:blipFill>
+        <p:spPr>
+          <a:xfrm>
+            <a:off x="4159391" y="3744615"/>
+            <a:ext cx="907565" cy="729059"/>
+          </a:xfrm>
+          <a:prstGeom prst="rect">
+            <a:avLst/>
+          </a:prstGeom>
+          <a:noFill/>
+          <a:ln>
+            <a:noFill/>
+          </a:ln>
+        </p:spPr>
+      </p:pic>
+      <p:sp>
+        <p:nvSpPr>
+          <p:cNvPr id="269" name="Google Shape;269;p17"/>
+          <p:cNvSpPr txBox="1"/>
+          <p:nvPr/>
+        </p:nvSpPr>
+        <p:spPr>
+          <a:xfrm>
+            <a:off x="1808364" y="3783013"/>
+            <a:ext cx="2598000" cy="535200"/>
+          </a:xfrm>
+          <a:prstGeom prst="rect">
+            <a:avLst/>
+          </a:prstGeom>
+          <a:noFill/>
+          <a:ln>
+            <a:noFill/>
+          </a:ln>
+        </p:spPr>
+        <p:txBody>
+          <a:bodyPr anchorCtr="0" anchor="t" bIns="51525" lIns="51525" spcFirstLastPara="1" rIns="51525" wrap="square" tIns="51525">
+            <a:spAutoFit/>
+          </a:bodyPr>
+          <a:lstStyle/>
+          <a:p>
+            <a:pPr indent="0" lvl="0" marL="0" rtl="0" algn="l">
+              <a:spcBef>
+                <a:spcPts val="0"/>
+              </a:spcBef>
+              <a:spcAft>
+                <a:spcPts val="0"/>
+              </a:spcAft>
+              <a:buNone/>
+            </a:pPr>
+            <a:r>
+              <a:rPr lang="en-GB" sz="700">
+                <a:solidFill>
+                  <a:schemeClr val="dk1"/>
+                </a:solidFill>
+              </a:rPr>
+              <a:t>The flat bit of the display spinner can be laser cutted with an SVG file, laser cutted acrylic have a smooth surface, and the colour could be black, giving it a minimalistic modern feel.</a:t>
+            </a:r>
+            <a:endParaRPr sz="700">
+              <a:solidFill>
+                <a:schemeClr val="dk1"/>
+              </a:solidFill>
+            </a:endParaRPr>
+          </a:p>
+          <a:p>
+            <a:pPr indent="0" lvl="0" marL="0" rtl="0" algn="l">
+              <a:spcBef>
+                <a:spcPts val="0"/>
+              </a:spcBef>
+              <a:spcAft>
+                <a:spcPts val="0"/>
+              </a:spcAft>
+              <a:buNone/>
+            </a:pPr>
+            <a:r>
+              <a:t/>
+            </a:r>
+            <a:endParaRPr sz="700"/>
+          </a:p>
+        </p:txBody>
+      </p:sp>
+      <p:pic>
+        <p:nvPicPr>
+          <p:cNvPr id="270" name="Google Shape;270;p17"/>
+          <p:cNvPicPr preferRelativeResize="0"/>
+          <p:nvPr/>
+        </p:nvPicPr>
+        <p:blipFill rotWithShape="1">
+          <a:blip r:embed="rId13">
+            <a:alphaModFix/>
+          </a:blip>
+          <a:srcRect b="55964" l="54597" r="31786" t="26144"/>
+          <a:stretch/>
+        </p:blipFill>
+        <p:spPr>
+          <a:xfrm>
+            <a:off x="2720161" y="4329419"/>
+            <a:ext cx="871797" cy="643947"/>
+          </a:xfrm>
+          <a:prstGeom prst="rect">
+            <a:avLst/>
+          </a:prstGeom>
+          <a:noFill/>
+          <a:ln>
+            <a:noFill/>
+          </a:ln>
+        </p:spPr>
+      </p:pic>
+      <p:cxnSp>
+        <p:nvCxnSpPr>
+          <p:cNvPr id="271" name="Google Shape;271;p17"/>
+          <p:cNvCxnSpPr>
+            <a:stCxn id="259" idx="1"/>
+          </p:cNvCxnSpPr>
+          <p:nvPr/>
+        </p:nvCxnSpPr>
+        <p:spPr>
+          <a:xfrm rot="10800000">
+            <a:off x="3362391" y="4696460"/>
+            <a:ext cx="444600" cy="145800"/>
+          </a:xfrm>
+          <a:prstGeom prst="straightConnector1">
+            <a:avLst/>
+          </a:prstGeom>
+          <a:noFill/>
+          <a:ln cap="flat" cmpd="sng" w="19050">
+            <a:solidFill>
+              <a:schemeClr val="dk2"/>
+            </a:solidFill>
+            <a:prstDash val="solid"/>
+            <a:round/>
+            <a:headEnd len="med" w="med" type="none"/>
+            <a:tailEnd len="med" w="med" type="stealth"/>
+          </a:ln>
+        </p:spPr>
+      </p:cxnSp>
+      <p:sp>
+        <p:nvSpPr>
+          <p:cNvPr id="272" name="Google Shape;272;p17"/>
+          <p:cNvSpPr txBox="1"/>
+          <p:nvPr/>
+        </p:nvSpPr>
+        <p:spPr>
+          <a:xfrm>
+            <a:off x="5614496" y="4161607"/>
+            <a:ext cx="1740300" cy="1073700"/>
+          </a:xfrm>
+          <a:prstGeom prst="rect">
+            <a:avLst/>
+          </a:prstGeom>
+          <a:noFill/>
+          <a:ln>
+            <a:noFill/>
+          </a:ln>
+        </p:spPr>
+        <p:txBody>
+          <a:bodyPr anchorCtr="0" anchor="t" bIns="51525" lIns="51525" spcFirstLastPara="1" rIns="51525" wrap="square" tIns="51525">
+            <a:spAutoFit/>
+          </a:bodyPr>
+          <a:lstStyle/>
+          <a:p>
+            <a:pPr indent="0" lvl="0" marL="0" rtl="0" algn="l">
+              <a:spcBef>
+                <a:spcPts val="0"/>
+              </a:spcBef>
+              <a:spcAft>
+                <a:spcPts val="0"/>
+              </a:spcAft>
+              <a:buClr>
+                <a:schemeClr val="dk1"/>
+              </a:buClr>
+              <a:buSzPts val="600"/>
+              <a:buFont typeface="Arial"/>
+              <a:buNone/>
+            </a:pPr>
+            <a:r>
+              <a:rPr lang="en-GB" sz="700">
+                <a:solidFill>
+                  <a:schemeClr val="dk1"/>
+                </a:solidFill>
+              </a:rPr>
+              <a:t>Cross section of how the motor will be placed in order to connect to the motor flange and display spinner. Display spinner will spin the displaying artifact 360 degrees to give the viewer a great viewing experience as the exclusivity of the artifact is emphasised as mentioned in the specification.</a:t>
+            </a:r>
+            <a:endParaRPr sz="700">
+              <a:solidFill>
+                <a:schemeClr val="dk1"/>
+              </a:solidFill>
+            </a:endParaRPr>
+          </a:p>
+          <a:p>
+            <a:pPr indent="0" lvl="0" marL="0" rtl="0" algn="l">
+              <a:spcBef>
+                <a:spcPts val="0"/>
+              </a:spcBef>
+              <a:spcAft>
+                <a:spcPts val="0"/>
+              </a:spcAft>
+              <a:buNone/>
+            </a:pPr>
+            <a:r>
+              <a:t/>
+            </a:r>
+            <a:endParaRPr sz="700"/>
+          </a:p>
+        </p:txBody>
+      </p:sp>
+      <p:cxnSp>
+        <p:nvCxnSpPr>
+          <p:cNvPr id="273" name="Google Shape;273;p17"/>
+          <p:cNvCxnSpPr/>
+          <p:nvPr/>
+        </p:nvCxnSpPr>
+        <p:spPr>
+          <a:xfrm flipH="1">
+            <a:off x="1555860" y="1146752"/>
+            <a:ext cx="764400" cy="531600"/>
+          </a:xfrm>
+          <a:prstGeom prst="straightConnector1">
+            <a:avLst/>
+          </a:prstGeom>
+          <a:noFill/>
+          <a:ln cap="flat" cmpd="sng" w="9525">
+            <a:solidFill>
+              <a:schemeClr val="dk2"/>
+            </a:solidFill>
+            <a:prstDash val="solid"/>
+            <a:round/>
+            <a:headEnd len="med" w="med" type="none"/>
+            <a:tailEnd len="med" w="med" type="triangle"/>
+          </a:ln>
+        </p:spPr>
+      </p:cxnSp>
+      <p:cxnSp>
+        <p:nvCxnSpPr>
+          <p:cNvPr id="274" name="Google Shape;274;p17"/>
+          <p:cNvCxnSpPr>
+            <a:stCxn id="267" idx="1"/>
+          </p:cNvCxnSpPr>
+          <p:nvPr/>
+        </p:nvCxnSpPr>
+        <p:spPr>
+          <a:xfrm flipH="1">
+            <a:off x="1541156" y="2012765"/>
+            <a:ext cx="873900" cy="100800"/>
+          </a:xfrm>
+          <a:prstGeom prst="straightConnector1">
+            <a:avLst/>
+          </a:prstGeom>
+          <a:noFill/>
+          <a:ln cap="flat" cmpd="sng" w="9525">
+            <a:solidFill>
+              <a:schemeClr val="dk2"/>
+            </a:solidFill>
+            <a:prstDash val="solid"/>
+            <a:round/>
+            <a:headEnd len="med" w="med" type="none"/>
+            <a:tailEnd len="med" w="med" type="triangle"/>
+          </a:ln>
+        </p:spPr>
+      </p:cxnSp>
+      <p:sp>
+        <p:nvSpPr>
+          <p:cNvPr id="275" name="Google Shape;275;p17"/>
+          <p:cNvSpPr txBox="1"/>
+          <p:nvPr/>
+        </p:nvSpPr>
+        <p:spPr>
+          <a:xfrm>
+            <a:off x="3852575" y="2871018"/>
+            <a:ext cx="1431000" cy="750600"/>
+          </a:xfrm>
+          <a:prstGeom prst="rect">
+            <a:avLst/>
+          </a:prstGeom>
+          <a:noFill/>
+          <a:ln>
+            <a:noFill/>
+          </a:ln>
+        </p:spPr>
+        <p:txBody>
+          <a:bodyPr anchorCtr="0" anchor="t" bIns="51525" lIns="51525" spcFirstLastPara="1" rIns="51525" wrap="square" tIns="51525">
+            <a:spAutoFit/>
+          </a:bodyPr>
+          <a:lstStyle/>
+          <a:p>
+            <a:pPr indent="0" lvl="0" marL="0" rtl="0" algn="l">
+              <a:spcBef>
+                <a:spcPts val="0"/>
+              </a:spcBef>
+              <a:spcAft>
+                <a:spcPts val="0"/>
+              </a:spcAft>
+              <a:buNone/>
+            </a:pPr>
+            <a:r>
+              <a:rPr lang="en-GB" sz="700"/>
+              <a:t>The bottom half of Design 5 will be made of rubberwood, and then painted black and sprayed clearcoat, as requested by the respondents in the survey I’ve conducted.</a:t>
+            </a:r>
+            <a:endParaRPr sz="700"/>
+          </a:p>
+        </p:txBody>
+      </p:sp>
+      <p:cxnSp>
+        <p:nvCxnSpPr>
+          <p:cNvPr id="276" name="Google Shape;276;p17"/>
+          <p:cNvCxnSpPr/>
+          <p:nvPr/>
+        </p:nvCxnSpPr>
+        <p:spPr>
+          <a:xfrm rot="10800000">
+            <a:off x="1783237" y="2439760"/>
+            <a:ext cx="2103900" cy="806100"/>
+          </a:xfrm>
+          <a:prstGeom prst="straightConnector1">
+            <a:avLst/>
+          </a:prstGeom>
+          <a:noFill/>
+          <a:ln cap="flat" cmpd="sng" w="9525">
+            <a:solidFill>
+              <a:schemeClr val="dk2"/>
+            </a:solidFill>
+            <a:prstDash val="solid"/>
+            <a:round/>
+            <a:headEnd len="med" w="med" type="none"/>
+            <a:tailEnd len="med" w="med" type="triangle"/>
+          </a:ln>
+        </p:spPr>
+      </p:cxnSp>
+      <p:sp>
+        <p:nvSpPr>
+          <p:cNvPr id="277" name="Google Shape;277;p17"/>
+          <p:cNvSpPr txBox="1"/>
+          <p:nvPr/>
+        </p:nvSpPr>
+        <p:spPr>
+          <a:xfrm>
+            <a:off x="2015916" y="2869599"/>
+            <a:ext cx="1604100" cy="966000"/>
+          </a:xfrm>
+          <a:prstGeom prst="rect">
+            <a:avLst/>
+          </a:prstGeom>
+          <a:noFill/>
+          <a:ln>
+            <a:noFill/>
+          </a:ln>
+        </p:spPr>
+        <p:txBody>
+          <a:bodyPr anchorCtr="0" anchor="t" bIns="51525" lIns="51525" spcFirstLastPara="1" rIns="51525" wrap="square" tIns="51525">
+            <a:spAutoFit/>
+          </a:bodyPr>
+          <a:lstStyle/>
+          <a:p>
+            <a:pPr indent="0" lvl="0" marL="0" rtl="0" algn="l">
+              <a:spcBef>
+                <a:spcPts val="0"/>
+              </a:spcBef>
+              <a:spcAft>
+                <a:spcPts val="0"/>
+              </a:spcAft>
+              <a:buNone/>
+            </a:pPr>
+            <a:r>
+              <a:rPr lang="en-GB" sz="700"/>
+              <a:t>This is where the extension cable will be inserted, to supply electricity to all respective electrical components in this design. Mains electricity will be converted to 6V DC for safety purposes, to prevent risk of death from electrocution as mentioned in specification</a:t>
+            </a:r>
+            <a:endParaRPr sz="700"/>
+          </a:p>
+        </p:txBody>
+      </p:sp>
+      <p:cxnSp>
+        <p:nvCxnSpPr>
+          <p:cNvPr id="278" name="Google Shape;278;p17"/>
+          <p:cNvCxnSpPr>
+            <a:stCxn id="277" idx="1"/>
+          </p:cNvCxnSpPr>
+          <p:nvPr/>
+        </p:nvCxnSpPr>
+        <p:spPr>
+          <a:xfrm rot="10800000">
+            <a:off x="1538616" y="3150699"/>
+            <a:ext cx="477300" cy="201900"/>
+          </a:xfrm>
+          <a:prstGeom prst="straightConnector1">
+            <a:avLst/>
+          </a:prstGeom>
+          <a:noFill/>
+          <a:ln cap="flat" cmpd="sng" w="9525">
+            <a:solidFill>
+              <a:schemeClr val="dk2"/>
+            </a:solidFill>
+            <a:prstDash val="solid"/>
+            <a:round/>
+            <a:headEnd len="med" w="med" type="none"/>
+            <a:tailEnd len="med" w="med" type="triangle"/>
+          </a:ln>
+        </p:spPr>
+      </p:cxnSp>
+      <p:sp>
+        <p:nvSpPr>
+          <p:cNvPr id="279" name="Google Shape;279;p17"/>
+          <p:cNvSpPr txBox="1"/>
+          <p:nvPr/>
+        </p:nvSpPr>
+        <p:spPr>
+          <a:xfrm>
+            <a:off x="2884427" y="2283943"/>
+            <a:ext cx="2730300" cy="642900"/>
+          </a:xfrm>
+          <a:prstGeom prst="rect">
+            <a:avLst/>
+          </a:prstGeom>
+          <a:noFill/>
+          <a:ln>
+            <a:noFill/>
+          </a:ln>
+        </p:spPr>
+        <p:txBody>
+          <a:bodyPr anchorCtr="0" anchor="t" bIns="51525" lIns="51525" spcFirstLastPara="1" rIns="51525" wrap="square" tIns="51525">
+            <a:spAutoFit/>
+          </a:bodyPr>
+          <a:lstStyle/>
+          <a:p>
+            <a:pPr indent="0" lvl="0" marL="0" rtl="0" algn="l">
+              <a:spcBef>
+                <a:spcPts val="0"/>
+              </a:spcBef>
+              <a:spcAft>
+                <a:spcPts val="0"/>
+              </a:spcAft>
+              <a:buClr>
+                <a:schemeClr val="dk1"/>
+              </a:buClr>
+              <a:buSzPts val="600"/>
+              <a:buFont typeface="Arial"/>
+              <a:buNone/>
+            </a:pPr>
+            <a:r>
+              <a:rPr lang="en-GB" sz="700">
+                <a:solidFill>
+                  <a:schemeClr val="dk1"/>
+                </a:solidFill>
+              </a:rPr>
+              <a:t>This design will incorporate 4 motion sensors, 1 on each side, to detect motion to know when to turn the LED lights and DC motor on or off. Components are turned off when no one is around in order to reduce energy consumption as stated in the specification.</a:t>
+            </a:r>
+            <a:endParaRPr sz="700">
+              <a:solidFill>
+                <a:schemeClr val="dk1"/>
+              </a:solidFill>
+            </a:endParaRPr>
+          </a:p>
+          <a:p>
+            <a:pPr indent="0" lvl="0" marL="0" rtl="0" algn="l">
+              <a:spcBef>
+                <a:spcPts val="0"/>
+              </a:spcBef>
+              <a:spcAft>
+                <a:spcPts val="0"/>
+              </a:spcAft>
+              <a:buNone/>
+            </a:pPr>
+            <a:r>
+              <a:t/>
+            </a:r>
+            <a:endParaRPr sz="700"/>
+          </a:p>
+        </p:txBody>
+      </p:sp>
+      <p:cxnSp>
+        <p:nvCxnSpPr>
+          <p:cNvPr id="280" name="Google Shape;280;p17"/>
+          <p:cNvCxnSpPr>
+            <a:stCxn id="279" idx="1"/>
+          </p:cNvCxnSpPr>
+          <p:nvPr/>
+        </p:nvCxnSpPr>
+        <p:spPr>
+          <a:xfrm flipH="1">
+            <a:off x="1613627" y="2605393"/>
+            <a:ext cx="1270800" cy="311700"/>
+          </a:xfrm>
+          <a:prstGeom prst="straightConnector1">
+            <a:avLst/>
+          </a:prstGeom>
+          <a:noFill/>
+          <a:ln cap="flat" cmpd="sng" w="9525">
+            <a:solidFill>
+              <a:schemeClr val="dk2"/>
+            </a:solidFill>
+            <a:prstDash val="solid"/>
+            <a:round/>
+            <a:headEnd len="med" w="med" type="none"/>
+            <a:tailEnd len="med" w="med" type="triangle"/>
+          </a:ln>
+        </p:spPr>
+      </p:cxnSp>
+      <p:cxnSp>
+        <p:nvCxnSpPr>
+          <p:cNvPr id="281" name="Google Shape;281;p17"/>
+          <p:cNvCxnSpPr>
+            <a:stCxn id="279" idx="1"/>
+          </p:cNvCxnSpPr>
+          <p:nvPr/>
+        </p:nvCxnSpPr>
+        <p:spPr>
+          <a:xfrm flipH="1">
+            <a:off x="920927" y="2605393"/>
+            <a:ext cx="1963500" cy="266700"/>
+          </a:xfrm>
+          <a:prstGeom prst="straightConnector1">
+            <a:avLst/>
+          </a:prstGeom>
+          <a:noFill/>
+          <a:ln cap="flat" cmpd="sng" w="9525">
+            <a:solidFill>
+              <a:schemeClr val="dk2"/>
+            </a:solidFill>
+            <a:prstDash val="solid"/>
+            <a:round/>
+            <a:headEnd len="med" w="med" type="none"/>
+            <a:tailEnd len="med" w="med" type="triangle"/>
+          </a:ln>
+        </p:spPr>
+      </p:cxnSp>
+      <p:pic>
+        <p:nvPicPr>
+          <p:cNvPr id="282" name="Google Shape;282;p17"/>
+          <p:cNvPicPr preferRelativeResize="0"/>
+          <p:nvPr/>
+        </p:nvPicPr>
+        <p:blipFill rotWithShape="1">
+          <a:blip r:embed="rId14">
+            <a:alphaModFix/>
+          </a:blip>
+          <a:srcRect b="17708" l="49194" r="42061" t="66279"/>
+          <a:stretch/>
+        </p:blipFill>
+        <p:spPr>
+          <a:xfrm>
+            <a:off x="5642247" y="102328"/>
+            <a:ext cx="842642" cy="867437"/>
+          </a:xfrm>
+          <a:prstGeom prst="rect">
+            <a:avLst/>
+          </a:prstGeom>
+          <a:noFill/>
+          <a:ln>
+            <a:noFill/>
+          </a:ln>
+        </p:spPr>
+      </p:pic>
+      <p:sp>
+        <p:nvSpPr>
+          <p:cNvPr id="283" name="Google Shape;283;p17"/>
+          <p:cNvSpPr txBox="1"/>
+          <p:nvPr/>
+        </p:nvSpPr>
+        <p:spPr>
+          <a:xfrm>
+            <a:off x="5066950" y="1033114"/>
+            <a:ext cx="1362300" cy="750600"/>
+          </a:xfrm>
+          <a:prstGeom prst="rect">
+            <a:avLst/>
+          </a:prstGeom>
+          <a:noFill/>
+          <a:ln>
+            <a:noFill/>
+          </a:ln>
+        </p:spPr>
+        <p:txBody>
+          <a:bodyPr anchorCtr="0" anchor="t" bIns="51525" lIns="51525" spcFirstLastPara="1" rIns="51525" wrap="square" tIns="51525">
+            <a:spAutoFit/>
+          </a:bodyPr>
+          <a:lstStyle/>
+          <a:p>
+            <a:pPr indent="0" lvl="0" marL="0" rtl="0" algn="l">
+              <a:spcBef>
+                <a:spcPts val="0"/>
+              </a:spcBef>
+              <a:spcAft>
+                <a:spcPts val="0"/>
+              </a:spcAft>
+              <a:buClr>
+                <a:schemeClr val="dk1"/>
+              </a:buClr>
+              <a:buSzPts val="600"/>
+              <a:buFont typeface="Arial"/>
+              <a:buNone/>
+            </a:pPr>
+            <a:r>
+              <a:rPr lang="en-GB" sz="700">
+                <a:solidFill>
+                  <a:schemeClr val="dk1"/>
+                </a:solidFill>
+              </a:rPr>
+              <a:t>An alternative to glueing the pieces of glass panels or acrylic together directly could be to use glass-to-glass steel partitioning joint.</a:t>
+            </a:r>
+            <a:endParaRPr sz="700">
+              <a:solidFill>
+                <a:schemeClr val="dk1"/>
+              </a:solidFill>
+            </a:endParaRPr>
+          </a:p>
+          <a:p>
+            <a:pPr indent="0" lvl="0" marL="0" rtl="0" algn="l">
+              <a:spcBef>
+                <a:spcPts val="0"/>
+              </a:spcBef>
+              <a:spcAft>
+                <a:spcPts val="0"/>
+              </a:spcAft>
+              <a:buNone/>
+            </a:pPr>
+            <a:r>
+              <a:t/>
+            </a:r>
+            <a:endParaRPr sz="700"/>
+          </a:p>
+        </p:txBody>
+      </p:sp>
+      <p:sp>
+        <p:nvSpPr>
+          <p:cNvPr id="284" name="Google Shape;284;p17"/>
+          <p:cNvSpPr txBox="1"/>
+          <p:nvPr/>
+        </p:nvSpPr>
+        <p:spPr>
+          <a:xfrm>
+            <a:off x="6083852" y="411102"/>
+            <a:ext cx="1270800" cy="750600"/>
+          </a:xfrm>
+          <a:prstGeom prst="rect">
+            <a:avLst/>
+          </a:prstGeom>
+          <a:noFill/>
+          <a:ln>
+            <a:noFill/>
+          </a:ln>
+        </p:spPr>
+        <p:txBody>
+          <a:bodyPr anchorCtr="0" anchor="t" bIns="51525" lIns="51525" spcFirstLastPara="1" rIns="51525" wrap="square" tIns="51525">
+            <a:spAutoFit/>
+          </a:bodyPr>
+          <a:lstStyle/>
+          <a:p>
+            <a:pPr indent="0" lvl="0" marL="0" rtl="0" algn="l">
+              <a:spcBef>
+                <a:spcPts val="0"/>
+              </a:spcBef>
+              <a:spcAft>
+                <a:spcPts val="0"/>
+              </a:spcAft>
+              <a:buNone/>
+            </a:pPr>
+            <a:r>
+              <a:rPr lang="en-GB" sz="700"/>
+              <a:t>Silicone will be use as the adhesive to join the steel and glass together. Silicone is extremely strong and will hold the side glass panes together well.</a:t>
+            </a:r>
+            <a:endParaRPr sz="700"/>
+          </a:p>
+        </p:txBody>
+      </p:sp>
+      <p:cxnSp>
+        <p:nvCxnSpPr>
+          <p:cNvPr id="285" name="Google Shape;285;p17"/>
+          <p:cNvCxnSpPr>
+            <a:stCxn id="283" idx="0"/>
+          </p:cNvCxnSpPr>
+          <p:nvPr/>
+        </p:nvCxnSpPr>
+        <p:spPr>
+          <a:xfrm flipH="1" rot="10800000">
+            <a:off x="5748100" y="457114"/>
+            <a:ext cx="75300" cy="576000"/>
+          </a:xfrm>
+          <a:prstGeom prst="straightConnector1">
+            <a:avLst/>
+          </a:prstGeom>
+          <a:noFill/>
+          <a:ln cap="flat" cmpd="sng" w="9525">
+            <a:solidFill>
+              <a:schemeClr val="dk2"/>
+            </a:solidFill>
+            <a:prstDash val="solid"/>
+            <a:round/>
+            <a:headEnd len="med" w="med" type="none"/>
+            <a:tailEnd len="med" w="med" type="triangle"/>
+          </a:ln>
+        </p:spPr>
+      </p:cxnSp>
+      <p:sp>
+        <p:nvSpPr>
+          <p:cNvPr id="286" name="Google Shape;286;p17"/>
+          <p:cNvSpPr txBox="1"/>
+          <p:nvPr/>
+        </p:nvSpPr>
+        <p:spPr>
+          <a:xfrm>
+            <a:off x="527307" y="4259539"/>
+            <a:ext cx="1923600" cy="966000"/>
+          </a:xfrm>
+          <a:prstGeom prst="rect">
+            <a:avLst/>
+          </a:prstGeom>
+          <a:noFill/>
+          <a:ln>
+            <a:noFill/>
+          </a:ln>
+        </p:spPr>
+        <p:txBody>
+          <a:bodyPr anchorCtr="0" anchor="t" bIns="51525" lIns="51525" spcFirstLastPara="1" rIns="51525" wrap="square" tIns="51525">
+            <a:spAutoFit/>
+          </a:bodyPr>
+          <a:lstStyle/>
+          <a:p>
+            <a:pPr indent="0" lvl="0" marL="0" rtl="0" algn="l">
+              <a:spcBef>
+                <a:spcPts val="0"/>
+              </a:spcBef>
+              <a:spcAft>
+                <a:spcPts val="0"/>
+              </a:spcAft>
+              <a:buNone/>
+            </a:pPr>
+            <a:r>
+              <a:rPr b="1" lang="en-GB" sz="700"/>
+              <a:t>Ergonomic Note</a:t>
+            </a:r>
+            <a:endParaRPr b="1" sz="700"/>
+          </a:p>
+          <a:p>
+            <a:pPr indent="0" lvl="0" marL="0" rtl="0" algn="l">
+              <a:spcBef>
+                <a:spcPts val="0"/>
+              </a:spcBef>
+              <a:spcAft>
+                <a:spcPts val="0"/>
+              </a:spcAft>
+              <a:buNone/>
+            </a:pPr>
+            <a:r>
+              <a:t/>
+            </a:r>
+            <a:endParaRPr b="1" sz="700"/>
+          </a:p>
+          <a:p>
+            <a:pPr indent="0" lvl="0" marL="0" rtl="0" algn="l">
+              <a:spcBef>
+                <a:spcPts val="0"/>
+              </a:spcBef>
+              <a:spcAft>
+                <a:spcPts val="0"/>
+              </a:spcAft>
+              <a:buNone/>
+            </a:pPr>
+            <a:r>
+              <a:rPr lang="en-GB" sz="700"/>
+              <a:t>The height of this design needs to be appropriate and ergonomic, in such that the user can easily observe/view the displaying artifacts in the display section without having to tiptoe or bend over, as mentioned in the specification.</a:t>
+            </a:r>
+            <a:endParaRPr sz="700"/>
+          </a:p>
+        </p:txBody>
+      </p:sp>
+      <p:cxnSp>
+        <p:nvCxnSpPr>
+          <p:cNvPr id="287" name="Google Shape;287;p17"/>
+          <p:cNvCxnSpPr>
+            <a:stCxn id="286" idx="0"/>
+          </p:cNvCxnSpPr>
+          <p:nvPr/>
+        </p:nvCxnSpPr>
+        <p:spPr>
+          <a:xfrm rot="10800000">
+            <a:off x="1343907" y="3028939"/>
+            <a:ext cx="145200" cy="1230600"/>
+          </a:xfrm>
+          <a:prstGeom prst="straightConnector1">
+            <a:avLst/>
+          </a:prstGeom>
+          <a:noFill/>
+          <a:ln cap="flat" cmpd="sng" w="9525">
+            <a:solidFill>
+              <a:schemeClr val="dk2"/>
+            </a:solidFill>
+            <a:prstDash val="solid"/>
+            <a:round/>
+            <a:headEnd len="med" w="med" type="none"/>
+            <a:tailEnd len="med" w="med" type="triangle"/>
+          </a:ln>
+        </p:spPr>
+      </p:cxnSp>
+      <p:sp>
+        <p:nvSpPr>
+          <p:cNvPr id="288" name="Google Shape;288;p17"/>
+          <p:cNvSpPr txBox="1"/>
+          <p:nvPr>
+            <p:ph idx="12" type="sldNum"/>
+          </p:nvPr>
+        </p:nvSpPr>
+        <p:spPr>
+          <a:xfrm>
+            <a:off x="5123820" y="2243290"/>
+            <a:ext cx="331800" cy="189300"/>
+          </a:xfrm>
+          <a:prstGeom prst="rect">
+            <a:avLst/>
+          </a:prstGeom>
+        </p:spPr>
+        <p:txBody>
+          <a:bodyPr anchorCtr="0" anchor="ctr" bIns="91425" lIns="91425" spcFirstLastPara="1" rIns="91425" wrap="square" tIns="91425">
+            <a:normAutofit fontScale="25000" lnSpcReduction="20000"/>
+          </a:bodyPr>
+          <a:lstStyle/>
+          <a:p>
+            <a:pPr indent="0" lvl="0" marL="0" rtl="0" algn="r">
+              <a:spcBef>
+                <a:spcPts val="0"/>
+              </a:spcBef>
+              <a:spcAft>
+                <a:spcPts val="0"/>
+              </a:spcAft>
+              <a:buNone/>
+            </a:pPr>
+            <a:fld id="{00000000-1234-1234-1234-123412341234}" type="slidenum">
+              <a:rPr lang="en-GB"/>
+              <a:t>‹#›</a:t>
+            </a:fld>
+            <a:endParaRPr/>
+          </a:p>
+        </p:txBody>
+      </p:sp>
+      <p:cxnSp>
+        <p:nvCxnSpPr>
+          <p:cNvPr id="289" name="Google Shape;289;p17"/>
+          <p:cNvCxnSpPr/>
+          <p:nvPr/>
+        </p:nvCxnSpPr>
+        <p:spPr>
+          <a:xfrm>
+            <a:off x="4090005" y="4066778"/>
+            <a:ext cx="340800" cy="0"/>
+          </a:xfrm>
+          <a:prstGeom prst="straightConnector1">
+            <a:avLst/>
+          </a:prstGeom>
+          <a:noFill/>
+          <a:ln cap="flat" cmpd="sng" w="9525">
+            <a:solidFill>
+              <a:schemeClr val="dk2"/>
+            </a:solidFill>
+            <a:prstDash val="solid"/>
+            <a:round/>
+            <a:headEnd len="med" w="med" type="none"/>
+            <a:tailEnd len="med" w="med" type="stealth"/>
+          </a:ln>
+        </p:spPr>
+      </p:cxnSp>
+      <p:sp>
+        <p:nvSpPr>
+          <p:cNvPr id="290" name="Google Shape;290;p17"/>
+          <p:cNvSpPr txBox="1"/>
+          <p:nvPr/>
+        </p:nvSpPr>
+        <p:spPr>
+          <a:xfrm>
+            <a:off x="250810" y="3286167"/>
+            <a:ext cx="871800" cy="1073700"/>
+          </a:xfrm>
+          <a:prstGeom prst="rect">
+            <a:avLst/>
+          </a:prstGeom>
+          <a:noFill/>
+          <a:ln>
+            <a:noFill/>
+          </a:ln>
+        </p:spPr>
+        <p:txBody>
+          <a:bodyPr anchorCtr="0" anchor="t" bIns="51525" lIns="51525" spcFirstLastPara="1" rIns="51525" wrap="square" tIns="51525">
+            <a:spAutoFit/>
+          </a:bodyPr>
+          <a:lstStyle/>
+          <a:p>
+            <a:pPr indent="0" lvl="0" marL="0" rtl="0" algn="l">
+              <a:spcBef>
+                <a:spcPts val="0"/>
+              </a:spcBef>
+              <a:spcAft>
+                <a:spcPts val="0"/>
+              </a:spcAft>
+              <a:buNone/>
+            </a:pPr>
+            <a:r>
+              <a:rPr lang="en-GB" sz="700"/>
+              <a:t>Inner section will be hollow to reduce weight of this design to allow ease of relocation and moving around, as mentioned in specification.</a:t>
+            </a:r>
+            <a:endParaRPr sz="700"/>
+          </a:p>
+        </p:txBody>
+      </p:sp>
+      <p:cxnSp>
+        <p:nvCxnSpPr>
+          <p:cNvPr id="291" name="Google Shape;291;p17"/>
+          <p:cNvCxnSpPr>
+            <a:stCxn id="290" idx="0"/>
+          </p:cNvCxnSpPr>
+          <p:nvPr/>
+        </p:nvCxnSpPr>
+        <p:spPr>
+          <a:xfrm flipH="1" rot="10800000">
+            <a:off x="686710" y="2889267"/>
+            <a:ext cx="43800" cy="396900"/>
+          </a:xfrm>
+          <a:prstGeom prst="straightConnector1">
+            <a:avLst/>
+          </a:prstGeom>
+          <a:noFill/>
+          <a:ln cap="flat" cmpd="sng" w="9525">
+            <a:solidFill>
+              <a:schemeClr val="dk2"/>
+            </a:solidFill>
+            <a:prstDash val="solid"/>
+            <a:round/>
+            <a:headEnd len="med" w="med" type="none"/>
+            <a:tailEnd len="med" w="med" type="stealth"/>
+          </a:ln>
+        </p:spPr>
+      </p:cxnSp>
+    </p:spTree>
+  </p:cSld>
+  <p:clrMapOvr>
+    <a:masterClrMapping/>
+  </p:clrMapOvr>
+</p:sld>
+</file>
+
 <file path=ppt/theme/theme1.xml><?xml version="1.0" encoding="utf-8"?>
+<a:theme xmlns:a="http://schemas.openxmlformats.org/drawingml/2006/main" xmlns:r="http://schemas.openxmlformats.org/officeDocument/2006/relationships">
+  <a:themeElements>
+    <a:clrScheme name="Default">
+      <a:dk1>
+        <a:srgbClr val="000000"/>
+      </a:dk1>
+      <a:lt1>
+        <a:srgbClr val="FFFFFF"/>
+      </a:lt1>
+      <a:dk2>
+        <a:srgbClr val="158158"/>
+      </a:dk2>
+      <a:lt2>
+        <a:srgbClr val="F3F3F3"/>
+      </a:lt2>
+      <a:accent1>
+        <a:srgbClr val="058DC7"/>
+      </a:accent1>
+      <a:accent2>
+        <a:srgbClr val="50B432"/>
+      </a:accent2>
+      <a:accent3>
+        <a:srgbClr val="ED561B"/>
+      </a:accent3>
+      <a:accent4>
+        <a:srgbClr val="EDEF00"/>
+      </a:accent4>
+      <a:accent5>
+        <a:srgbClr val="24CBE5"/>
+      </a:accent5>
+      <a:accent6>
+        <a:srgbClr val="64E572"/>
+      </a:accent6>
+      <a:hlink>
+        <a:srgbClr val="2200CC"/>
+      </a:hlink>
+      <a:folHlink>
+        <a:srgbClr val="551A8B"/>
+      </a:folHlink>
+    </a:clrScheme>
+    <a:fontScheme name="Office">
+      <a:majorFont>
+        <a:latin typeface="Arial"/>
+        <a:ea typeface=""/>
+        <a:cs typeface=""/>
+        <a:font script="Jpan" typeface="ＭＳ Ｐゴシック"/>
+        <a:font script="Hang" typeface="맑은 고딕"/>
+        <a:font script="Hans" typeface="宋体"/>
+        <a:font script="Hant" typeface="新細明體"/>
+        <a:font script="Arab" typeface="Times New Roman"/>
+        <a:font script="Hebr" typeface="Times New Roman"/>
+        <a:font script="Thai" typeface="Angsana New"/>
+        <a:font script="Ethi" typeface="Nyala"/>
+        <a:font script="Beng" typeface="Vrinda"/>
+        <a:font script="Gujr" typeface="Shruti"/>
+        <a:font script="Khmr" typeface="MoolBoran"/>
+        <a:font script="Knda" typeface="Tunga"/>
+        <a:font script="Guru" typeface="Raavi"/>
+        <a:font script="Cans" typeface="Euphemia"/>
+        <a:font script="Cher" typeface="Plantagenet Cherokee"/>
+        <a:font script="Yiii" typeface="Microsoft Yi Baiti"/>
+        <a:font script="Tibt" typeface="Microsoft Himalaya"/>
+        <a:font script="Thaa" typeface="MV Boli"/>
+        <a:font script="Deva" typeface="Mangal"/>
+        <a:font script="Telu" typeface="Gautami"/>
+        <a:font script="Taml" typeface="Latha"/>
+        <a:font script="Syrc" typeface="Estrangelo Edessa"/>
+        <a:font script="Orya" typeface="Kalinga"/>
+        <a:font script="Mlym" typeface="Kartika"/>
+        <a:font script="Laoo" typeface="DokChampa"/>
+        <a:font script="Sinh" typeface="Iskoola Pota"/>
+        <a:font script="Mong" typeface="Mongolian Baiti"/>
+        <a:font script="Viet" typeface="Times New Roman"/>
+        <a:font script="Uigh" typeface="Microsoft Uighur"/>
+        <a:font script="Geor" typeface="Sylfaen"/>
+      </a:majorFont>
+      <a:minorFont>
+        <a:latin typeface="Arial"/>
+        <a:ea typeface=""/>
+        <a:cs typeface=""/>
+        <a:font script="Jpan" typeface="ＭＳ Ｐゴシック"/>
+        <a:font script="Hang" typeface="맑은 고딕"/>
+        <a:font script="Hans" typeface="宋体"/>
+        <a:font script="Hant" typeface="新細明體"/>
+        <a:font script="Arab" typeface="Arial"/>
+        <a:font script="Hebr" typeface="Arial"/>
+        <a:font script="Thai" typeface="Cordia New"/>
+        <a:font script="Ethi" typeface="Nyala"/>
+        <a:font script="Beng" typeface="Vrinda"/>
+        <a:font script="Gujr" typeface="Shruti"/>
+        <a:font script="Khmr" typeface="DaunPenh"/>
+        <a:font script="Knda" typeface="Tunga"/>
+        <a:font script="Guru" typeface="Raavi"/>
+        <a:font script="Cans" typeface="Euphemia"/>
+        <a:font script="Cher" typeface="Plantagenet Cherokee"/>
+        <a:font script="Yiii" typeface="Microsoft Yi Baiti"/>
+        <a:font script="Tibt" typeface="Microsoft Himalaya"/>
+        <a:font script="Thaa" typeface="MV Boli"/>
+        <a:font script="Deva" typeface="Mangal"/>
+        <a:font script="Telu" typeface="Gautami"/>
+        <a:font script="Taml" typeface="Latha"/>
+        <a:font script="Syrc" typeface="Estrangelo Edessa"/>
+        <a:font script="Orya" typeface="Kalinga"/>
+        <a:font script="Mlym" typeface="Kartika"/>
+        <a:font script="Laoo" typeface="DokChampa"/>
+        <a:font script="Sinh" typeface="Iskoola Pota"/>
+        <a:font script="Mong" typeface="Mongolian Baiti"/>
+        <a:font script="Viet" typeface="Arial"/>
+        <a:font script="Uigh" typeface="Microsoft Uighur"/>
+        <a:font script="Geor" typeface="Sylfaen"/>
+      </a:minorFont>
+    </a:fontScheme>
+    <a:fmtScheme name="Office">
+      <a:fillStyleLst>
+        <a:solidFill>
+          <a:schemeClr val="phClr"/>
+        </a:solidFill>
+        <a:gradFill rotWithShape="1">
+          <a:gsLst>
+            <a:gs pos="0">
+              <a:schemeClr val="phClr">
+                <a:tint val="50000"/>
+                <a:satMod val="300000"/>
+              </a:schemeClr>
+            </a:gs>
+            <a:gs pos="35000">
+              <a:schemeClr val="phClr">
+                <a:tint val="37000"/>
+                <a:satMod val="300000"/>
+              </a:schemeClr>
+            </a:gs>
+            <a:gs pos="100000">
+              <a:schemeClr val="phClr">
+                <a:tint val="15000"/>
+                <a:satMod val="350000"/>
+              </a:schemeClr>
+            </a:gs>
+          </a:gsLst>
+          <a:lin ang="16200000" scaled="1"/>
+        </a:gradFill>
+        <a:gradFill rotWithShape="1">
+          <a:gsLst>
+            <a:gs pos="0">
+              <a:schemeClr val="phClr">
+                <a:tint val="100000"/>
+                <a:shade val="100000"/>
+                <a:satMod val="130000"/>
+              </a:schemeClr>
+            </a:gs>
+            <a:gs pos="100000">
+              <a:schemeClr val="phClr">
+                <a:tint val="50000"/>
+                <a:shade val="100000"/>
+                <a:satMod val="350000"/>
+              </a:schemeClr>
+            </a:gs>
+          </a:gsLst>
+          <a:lin ang="16200000" scaled="0"/>
+        </a:gradFill>
+      </a:fillStyleLst>
+      <a:lnStyleLst>
+        <a:ln w="9525" cap="flat" cmpd="sng" algn="ctr">
+          <a:solidFill>
+            <a:schemeClr val="phClr">
+              <a:shade val="95000"/>
+              <a:satMod val="105000"/>
+            </a:schemeClr>
+          </a:solidFill>
+          <a:prstDash val="solid"/>
+        </a:ln>
+        <a:ln w="25400" cap="flat" cmpd="sng" algn="ctr">
+          <a:solidFill>
+            <a:schemeClr val="phClr"/>
+          </a:solidFill>
+          <a:prstDash val="solid"/>
+        </a:ln>
+        <a:ln w="38100" cap="flat" cmpd="sng" algn="ctr">
+          <a:solidFill>
+            <a:schemeClr val="phClr"/>
+          </a:solidFill>
+          <a:prstDash val="solid"/>
+        </a:ln>
+      </a:lnStyleLst>
+      <a:effectStyleLst>
+        <a:effectStyle>
+          <a:effectLst>
+            <a:outerShdw blurRad="40000" dist="20000" dir="5400000" rotWithShape="0">
+              <a:srgbClr val="000000">
+                <a:alpha val="38000"/>
+              </a:srgbClr>
+            </a:outerShdw>
+          </a:effectLst>
+        </a:effectStyle>
+        <a:effectStyle>
+          <a:effectLst>
+            <a:outerShdw blurRad="40000" dist="23000" dir="5400000" rotWithShape="0">
+              <a:srgbClr val="000000">
+                <a:alpha val="35000"/>
+              </a:srgbClr>
+            </a:outerShdw>
+          </a:effectLst>
+        </a:effectStyle>
+        <a:effectStyle>
+          <a:effectLst>
+            <a:outerShdw blurRad="40000" dist="23000" dir="5400000" rotWithShape="0">
+              <a:srgbClr val="000000">
+                <a:alpha val="35000"/>
+              </a:srgbClr>
+            </a:outerShdw>
+          </a:effectLst>
+          <a:scene3d>
+            <a:camera prst="orthographicFront">
+              <a:rot lat="0" lon="0" rev="0"/>
+            </a:camera>
+            <a:lightRig rig="threePt" dir="t">
+              <a:rot lat="0" lon="0" rev="1200000"/>
+            </a:lightRig>
+          </a:scene3d>
+          <a:sp3d>
+            <a:bevelT w="63500" h="25400"/>
+          </a:sp3d>
+        </a:effectStyle>
+      </a:effectStyleLst>
+      <a:bgFillStyleLst>
+        <a:solidFill>
+          <a:schemeClr val="phClr"/>
+        </a:solidFill>
+        <a:gradFill rotWithShape="1">
+          <a:gsLst>
+            <a:gs pos="0">
+              <a:schemeClr val="phClr">
+                <a:tint val="40000"/>
+                <a:satMod val="350000"/>
+              </a:schemeClr>
+            </a:gs>
+            <a:gs pos="40000">
+              <a:schemeClr val="phClr">
+                <a:tint val="45000"/>
+                <a:shade val="99000"/>
+                <a:satMod val="350000"/>
+              </a:schemeClr>
+            </a:gs>
+            <a:gs pos="100000">
+              <a:schemeClr val="phClr">
+                <a:shade val="20000"/>
+                <a:satMod val="255000"/>
+              </a:schemeClr>
+            </a:gs>
+          </a:gsLst>
+          <a:path path="circle">
+            <a:fillToRect l="50000" t="-80000" r="50000" b="180000"/>
+          </a:path>
+        </a:gradFill>
+        <a:gradFill rotWithShape="1">
+          <a:gsLst>
+            <a:gs pos="0">
+              <a:schemeClr val="phClr">
+                <a:tint val="80000"/>
+                <a:satMod val="300000"/>
+              </a:schemeClr>
+            </a:gs>
+            <a:gs pos="100000">
+              <a:schemeClr val="phClr">
+                <a:shade val="30000"/>
+                <a:satMod val="200000"/>
+              </a:schemeClr>
+            </a:gs>
+          </a:gsLst>
+          <a:path path="circle">
+            <a:fillToRect l="50000" t="50000" r="50000" b="50000"/>
+          </a:path>
+        </a:gradFill>
+      </a:bgFillStyleLst>
+    </a:fmtScheme>
+  </a:themeElements>
+</a:theme>
+</file>
+
+<file path=ppt/theme/theme2.xml><?xml version="1.0" encoding="utf-8"?>
 <a:theme xmlns:a="http://schemas.openxmlformats.org/drawingml/2006/main" xmlns:r="http://schemas.openxmlformats.org/officeDocument/2006/relationships" name="Simple Light">
   <a:themeElements>
     <a:clrScheme name="Simple Light">
@@ -12569,283 +14757,4 @@
     </a:fmtScheme>
   </a:themeElements>
 </a:theme>
-</file>
-
-<file path=ppt/theme/theme2.xml><?xml version="1.0" encoding="utf-8"?>
-<a:theme xmlns:a="http://schemas.openxmlformats.org/drawingml/2006/main" xmlns:r="http://schemas.openxmlformats.org/officeDocument/2006/relationships">
-  <a:themeElements>
-    <a:clrScheme name="Default">
-      <a:dk1>
-        <a:srgbClr val="000000"/>
-      </a:dk1>
-      <a:lt1>
-        <a:srgbClr val="FFFFFF"/>
-      </a:lt1>
-      <a:dk2>
-        <a:srgbClr val="158158"/>
-      </a:dk2>
-      <a:lt2>
-        <a:srgbClr val="F3F3F3"/>
-      </a:lt2>
-      <a:accent1>
-        <a:srgbClr val="058DC7"/>
-      </a:accent1>
-      <a:accent2>
-        <a:srgbClr val="50B432"/>
-      </a:accent2>
-      <a:accent3>
-        <a:srgbClr val="ED561B"/>
-      </a:accent3>
-      <a:accent4>
-        <a:srgbClr val="EDEF00"/>
-      </a:accent4>
-      <a:accent5>
-        <a:srgbClr val="24CBE5"/>
-      </a:accent5>
-      <a:accent6>
-        <a:srgbClr val="64E572"/>
-      </a:accent6>
-      <a:hlink>
-        <a:srgbClr val="2200CC"/>
-      </a:hlink>
-      <a:folHlink>
-        <a:srgbClr val="551A8B"/>
-      </a:folHlink>
-    </a:clrScheme>
-    <a:fontScheme name="Office">
-      <a:majorFont>
-        <a:latin typeface="Arial"/>
-        <a:ea typeface=""/>
-        <a:cs typeface=""/>
-        <a:font script="Jpan" typeface="ＭＳ Ｐゴシック"/>
-        <a:font script="Hang" typeface="맑은 고딕"/>
-        <a:font script="Hans" typeface="宋体"/>
-        <a:font script="Hant" typeface="新細明體"/>
-        <a:font script="Arab" typeface="Times New Roman"/>
-        <a:font script="Hebr" typeface="Times New Roman"/>
-        <a:font script="Thai" typeface="Angsana New"/>
-        <a:font script="Ethi" typeface="Nyala"/>
-        <a:font script="Beng" typeface="Vrinda"/>
-        <a:font script="Gujr" typeface="Shruti"/>
-        <a:font script="Khmr" typeface="MoolBoran"/>
-        <a:font script="Knda" typeface="Tunga"/>
-        <a:font script="Guru" typeface="Raavi"/>
-        <a:font script="Cans" typeface="Euphemia"/>
-        <a:font script="Cher" typeface="Plantagenet Cherokee"/>
-        <a:font script="Yiii" typeface="Microsoft Yi Baiti"/>
-        <a:font script="Tibt" typeface="Microsoft Himalaya"/>
-        <a:font script="Thaa" typeface="MV Boli"/>
-        <a:font script="Deva" typeface="Mangal"/>
-        <a:font script="Telu" typeface="Gautami"/>
-        <a:font script="Taml" typeface="Latha"/>
-        <a:font script="Syrc" typeface="Estrangelo Edessa"/>
-        <a:font script="Orya" typeface="Kalinga"/>
-        <a:font script="Mlym" typeface="Kartika"/>
-        <a:font script="Laoo" typeface="DokChampa"/>
-        <a:font script="Sinh" typeface="Iskoola Pota"/>
-        <a:font script="Mong" typeface="Mongolian Baiti"/>
-        <a:font script="Viet" typeface="Times New Roman"/>
-        <a:font script="Uigh" typeface="Microsoft Uighur"/>
-        <a:font script="Geor" typeface="Sylfaen"/>
-      </a:majorFont>
-      <a:minorFont>
-        <a:latin typeface="Arial"/>
-        <a:ea typeface=""/>
-        <a:cs typeface=""/>
-        <a:font script="Jpan" typeface="ＭＳ Ｐゴシック"/>
-        <a:font script="Hang" typeface="맑은 고딕"/>
-        <a:font script="Hans" typeface="宋体"/>
-        <a:font script="Hant" typeface="新細明體"/>
-        <a:font script="Arab" typeface="Arial"/>
-        <a:font script="Hebr" typeface="Arial"/>
-        <a:font script="Thai" typeface="Cordia New"/>
-        <a:font script="Ethi" typeface="Nyala"/>
-        <a:font script="Beng" typeface="Vrinda"/>
-        <a:font script="Gujr" typeface="Shruti"/>
-        <a:font script="Khmr" typeface="DaunPenh"/>
-        <a:font script="Knda" typeface="Tunga"/>
-        <a:font script="Guru" typeface="Raavi"/>
-        <a:font script="Cans" typeface="Euphemia"/>
-        <a:font script="Cher" typeface="Plantagenet Cherokee"/>
-        <a:font script="Yiii" typeface="Microsoft Yi Baiti"/>
-        <a:font script="Tibt" typeface="Microsoft Himalaya"/>
-        <a:font script="Thaa" typeface="MV Boli"/>
-        <a:font script="Deva" typeface="Mangal"/>
-        <a:font script="Telu" typeface="Gautami"/>
-        <a:font script="Taml" typeface="Latha"/>
-        <a:font script="Syrc" typeface="Estrangelo Edessa"/>
-        <a:font script="Orya" typeface="Kalinga"/>
-        <a:font script="Mlym" typeface="Kartika"/>
-        <a:font script="Laoo" typeface="DokChampa"/>
-        <a:font script="Sinh" typeface="Iskoola Pota"/>
-        <a:font script="Mong" typeface="Mongolian Baiti"/>
-        <a:font script="Viet" typeface="Arial"/>
-        <a:font script="Uigh" typeface="Microsoft Uighur"/>
-        <a:font script="Geor" typeface="Sylfaen"/>
-      </a:minorFont>
-    </a:fontScheme>
-    <a:fmtScheme name="Office">
-      <a:fillStyleLst>
-        <a:solidFill>
-          <a:schemeClr val="phClr"/>
-        </a:solidFill>
-        <a:gradFill rotWithShape="1">
-          <a:gsLst>
-            <a:gs pos="0">
-              <a:schemeClr val="phClr">
-                <a:tint val="50000"/>
-                <a:satMod val="300000"/>
-              </a:schemeClr>
-            </a:gs>
-            <a:gs pos="35000">
-              <a:schemeClr val="phClr">
-                <a:tint val="37000"/>
-                <a:satMod val="300000"/>
-              </a:schemeClr>
-            </a:gs>
-            <a:gs pos="100000">
-              <a:schemeClr val="phClr">
-                <a:tint val="15000"/>
-                <a:satMod val="350000"/>
-              </a:schemeClr>
-            </a:gs>
-          </a:gsLst>
-          <a:lin ang="16200000" scaled="1"/>
-        </a:gradFill>
-        <a:gradFill rotWithShape="1">
-          <a:gsLst>
-            <a:gs pos="0">
-              <a:schemeClr val="phClr">
-                <a:tint val="100000"/>
-                <a:shade val="100000"/>
-                <a:satMod val="130000"/>
-              </a:schemeClr>
-            </a:gs>
-            <a:gs pos="100000">
-              <a:schemeClr val="phClr">
-                <a:tint val="50000"/>
-                <a:shade val="100000"/>
-                <a:satMod val="350000"/>
-              </a:schemeClr>
-            </a:gs>
-          </a:gsLst>
-          <a:lin ang="16200000" scaled="0"/>
-        </a:gradFill>
-      </a:fillStyleLst>
-      <a:lnStyleLst>
-        <a:ln w="9525" cap="flat" cmpd="sng" algn="ctr">
-          <a:solidFill>
-            <a:schemeClr val="phClr">
-              <a:shade val="95000"/>
-              <a:satMod val="105000"/>
-            </a:schemeClr>
-          </a:solidFill>
-          <a:prstDash val="solid"/>
-        </a:ln>
-        <a:ln w="25400" cap="flat" cmpd="sng" algn="ctr">
-          <a:solidFill>
-            <a:schemeClr val="phClr"/>
-          </a:solidFill>
-          <a:prstDash val="solid"/>
-        </a:ln>
-        <a:ln w="38100" cap="flat" cmpd="sng" algn="ctr">
-          <a:solidFill>
-            <a:schemeClr val="phClr"/>
-          </a:solidFill>
-          <a:prstDash val="solid"/>
-        </a:ln>
-      </a:lnStyleLst>
-      <a:effectStyleLst>
-        <a:effectStyle>
-          <a:effectLst>
-            <a:outerShdw blurRad="40000" dist="20000" dir="5400000" rotWithShape="0">
-              <a:srgbClr val="000000">
-                <a:alpha val="38000"/>
-              </a:srgbClr>
-            </a:outerShdw>
-          </a:effectLst>
-        </a:effectStyle>
-        <a:effectStyle>
-          <a:effectLst>
-            <a:outerShdw blurRad="40000" dist="23000" dir="5400000" rotWithShape="0">
-              <a:srgbClr val="000000">
-                <a:alpha val="35000"/>
-              </a:srgbClr>
-            </a:outerShdw>
-          </a:effectLst>
-        </a:effectStyle>
-        <a:effectStyle>
-          <a:effectLst>
-            <a:outerShdw blurRad="40000" dist="23000" dir="5400000" rotWithShape="0">
-              <a:srgbClr val="000000">
-                <a:alpha val="35000"/>
-              </a:srgbClr>
-            </a:outerShdw>
-          </a:effectLst>
-          <a:scene3d>
-            <a:camera prst="orthographicFront">
-              <a:rot lat="0" lon="0" rev="0"/>
-            </a:camera>
-            <a:lightRig rig="threePt" dir="t">
-              <a:rot lat="0" lon="0" rev="1200000"/>
-            </a:lightRig>
-          </a:scene3d>
-          <a:sp3d>
-            <a:bevelT w="63500" h="25400"/>
-          </a:sp3d>
-        </a:effectStyle>
-      </a:effectStyleLst>
-      <a:bgFillStyleLst>
-        <a:solidFill>
-          <a:schemeClr val="phClr"/>
-        </a:solidFill>
-        <a:gradFill rotWithShape="1">
-          <a:gsLst>
-            <a:gs pos="0">
-              <a:schemeClr val="phClr">
-                <a:tint val="40000"/>
-                <a:satMod val="350000"/>
-              </a:schemeClr>
-            </a:gs>
-            <a:gs pos="40000">
-              <a:schemeClr val="phClr">
-                <a:tint val="45000"/>
-                <a:shade val="99000"/>
-                <a:satMod val="350000"/>
-              </a:schemeClr>
-            </a:gs>
-            <a:gs pos="100000">
-              <a:schemeClr val="phClr">
-                <a:shade val="20000"/>
-                <a:satMod val="255000"/>
-              </a:schemeClr>
-            </a:gs>
-          </a:gsLst>
-          <a:path path="circle">
-            <a:fillToRect l="50000" t="-80000" r="50000" b="180000"/>
-          </a:path>
-        </a:gradFill>
-        <a:gradFill rotWithShape="1">
-          <a:gsLst>
-            <a:gs pos="0">
-              <a:schemeClr val="phClr">
-                <a:tint val="80000"/>
-                <a:satMod val="300000"/>
-              </a:schemeClr>
-            </a:gs>
-            <a:gs pos="100000">
-              <a:schemeClr val="phClr">
-                <a:shade val="30000"/>
-                <a:satMod val="200000"/>
-              </a:schemeClr>
-            </a:gs>
-          </a:gsLst>
-          <a:path path="circle">
-            <a:fillToRect l="50000" t="50000" r="50000" b="50000"/>
-          </a:path>
-        </a:gradFill>
-      </a:bgFillStyleLst>
-    </a:fmtScheme>
-  </a:themeElements>
-</a:theme>
 </file>
</xml_diff>